<commit_message>
initial sketch mostly done
</commit_message>
<xml_diff>
--- a/pycon2020_sketch.pptx
+++ b/pycon2020_sketch.pptx
@@ -4,6 +4,9 @@
   <p:sldMasterIdLst>
     <p:sldMasterId id="2147483648" r:id="rId1"/>
   </p:sldMasterIdLst>
+  <p:notesMasterIdLst>
+    <p:notesMasterId r:id="rId20"/>
+  </p:notesMasterIdLst>
   <p:sldIdLst>
     <p:sldId id="256" r:id="rId2"/>
     <p:sldId id="257" r:id="rId3"/>
@@ -12,14 +15,17 @@
     <p:sldId id="260" r:id="rId6"/>
     <p:sldId id="261" r:id="rId7"/>
     <p:sldId id="265" r:id="rId8"/>
-    <p:sldId id="262" r:id="rId9"/>
-    <p:sldId id="266" r:id="rId10"/>
-    <p:sldId id="263" r:id="rId11"/>
-    <p:sldId id="267" r:id="rId12"/>
-    <p:sldId id="264" r:id="rId13"/>
-    <p:sldId id="268" r:id="rId14"/>
-    <p:sldId id="269" r:id="rId15"/>
-    <p:sldId id="270" r:id="rId16"/>
+    <p:sldId id="264" r:id="rId9"/>
+    <p:sldId id="268" r:id="rId10"/>
+    <p:sldId id="271" r:id="rId11"/>
+    <p:sldId id="269" r:id="rId12"/>
+    <p:sldId id="272" r:id="rId13"/>
+    <p:sldId id="270" r:id="rId14"/>
+    <p:sldId id="262" r:id="rId15"/>
+    <p:sldId id="266" r:id="rId16"/>
+    <p:sldId id="263" r:id="rId17"/>
+    <p:sldId id="267" r:id="rId18"/>
+    <p:sldId id="273" r:id="rId19"/>
   </p:sldIdLst>
   <p:sldSz cx="12192000" cy="6858000"/>
   <p:notesSz cx="6858000" cy="9144000"/>
@@ -119,6 +125,662 @@
     </a:lvl9pPr>
   </p:defaultTextStyle>
 </p:presentation>
+</file>
+
+<file path=ppt/notesMasters/notesMaster1.xml><?xml version="1.0" encoding="utf-8"?>
+<p:notesMaster xmlns:a="http://schemas.openxmlformats.org/drawingml/2006/main" xmlns:r="http://schemas.openxmlformats.org/officeDocument/2006/relationships" xmlns:p="http://schemas.openxmlformats.org/presentationml/2006/main">
+  <p:cSld>
+    <p:bg>
+      <p:bgRef idx="1001">
+        <a:schemeClr val="bg1"/>
+      </p:bgRef>
+    </p:bg>
+    <p:spTree>
+      <p:nvGrpSpPr>
+        <p:cNvPr id="1" name=""/>
+        <p:cNvGrpSpPr/>
+        <p:nvPr/>
+      </p:nvGrpSpPr>
+      <p:grpSpPr>
+        <a:xfrm>
+          <a:off x="0" y="0"/>
+          <a:ext cx="0" cy="0"/>
+          <a:chOff x="0" y="0"/>
+          <a:chExt cx="0" cy="0"/>
+        </a:xfrm>
+      </p:grpSpPr>
+      <p:sp>
+        <p:nvSpPr>
+          <p:cNvPr id="2" name="Header Placeholder 1"/>
+          <p:cNvSpPr>
+            <a:spLocks noGrp="1"/>
+          </p:cNvSpPr>
+          <p:nvPr>
+            <p:ph type="hdr" sz="quarter"/>
+          </p:nvPr>
+        </p:nvSpPr>
+        <p:spPr>
+          <a:xfrm>
+            <a:off x="0" y="0"/>
+            <a:ext cx="2971800" cy="458788"/>
+          </a:xfrm>
+          <a:prstGeom prst="rect">
+            <a:avLst/>
+          </a:prstGeom>
+        </p:spPr>
+        <p:txBody>
+          <a:bodyPr vert="horz" lIns="91440" tIns="45720" rIns="91440" bIns="45720" rtlCol="0"/>
+          <a:lstStyle>
+            <a:lvl1pPr algn="l">
+              <a:defRPr sz="1200"/>
+            </a:lvl1pPr>
+          </a:lstStyle>
+          <a:p>
+            <a:endParaRPr lang="en-AU"/>
+          </a:p>
+        </p:txBody>
+      </p:sp>
+      <p:sp>
+        <p:nvSpPr>
+          <p:cNvPr id="3" name="Date Placeholder 2"/>
+          <p:cNvSpPr>
+            <a:spLocks noGrp="1"/>
+          </p:cNvSpPr>
+          <p:nvPr>
+            <p:ph type="dt" idx="1"/>
+          </p:nvPr>
+        </p:nvSpPr>
+        <p:spPr>
+          <a:xfrm>
+            <a:off x="3884613" y="0"/>
+            <a:ext cx="2971800" cy="458788"/>
+          </a:xfrm>
+          <a:prstGeom prst="rect">
+            <a:avLst/>
+          </a:prstGeom>
+        </p:spPr>
+        <p:txBody>
+          <a:bodyPr vert="horz" lIns="91440" tIns="45720" rIns="91440" bIns="45720" rtlCol="0"/>
+          <a:lstStyle>
+            <a:lvl1pPr algn="r">
+              <a:defRPr sz="1200"/>
+            </a:lvl1pPr>
+          </a:lstStyle>
+          <a:p>
+            <a:fld id="{2B78793A-2BDC-4FB5-976E-26BEDE7ADA80}" type="datetimeFigureOut">
+              <a:rPr lang="en-AU" smtClean="0"/>
+              <a:t>31/08/2020</a:t>
+            </a:fld>
+            <a:endParaRPr lang="en-AU"/>
+          </a:p>
+        </p:txBody>
+      </p:sp>
+      <p:sp>
+        <p:nvSpPr>
+          <p:cNvPr id="4" name="Slide Image Placeholder 3"/>
+          <p:cNvSpPr>
+            <a:spLocks noGrp="1" noRot="1" noChangeAspect="1"/>
+          </p:cNvSpPr>
+          <p:nvPr>
+            <p:ph type="sldImg" idx="2"/>
+          </p:nvPr>
+        </p:nvSpPr>
+        <p:spPr>
+          <a:xfrm>
+            <a:off x="685800" y="1143000"/>
+            <a:ext cx="5486400" cy="3086100"/>
+          </a:xfrm>
+          <a:prstGeom prst="rect">
+            <a:avLst/>
+          </a:prstGeom>
+          <a:noFill/>
+          <a:ln w="12700">
+            <a:solidFill>
+              <a:prstClr val="black"/>
+            </a:solidFill>
+          </a:ln>
+        </p:spPr>
+        <p:txBody>
+          <a:bodyPr vert="horz" lIns="91440" tIns="45720" rIns="91440" bIns="45720" rtlCol="0" anchor="ctr"/>
+          <a:lstStyle/>
+          <a:p>
+            <a:endParaRPr lang="en-AU"/>
+          </a:p>
+        </p:txBody>
+      </p:sp>
+      <p:sp>
+        <p:nvSpPr>
+          <p:cNvPr id="5" name="Notes Placeholder 4"/>
+          <p:cNvSpPr>
+            <a:spLocks noGrp="1"/>
+          </p:cNvSpPr>
+          <p:nvPr>
+            <p:ph type="body" sz="quarter" idx="3"/>
+          </p:nvPr>
+        </p:nvSpPr>
+        <p:spPr>
+          <a:xfrm>
+            <a:off x="685800" y="4400550"/>
+            <a:ext cx="5486400" cy="3600450"/>
+          </a:xfrm>
+          <a:prstGeom prst="rect">
+            <a:avLst/>
+          </a:prstGeom>
+        </p:spPr>
+        <p:txBody>
+          <a:bodyPr vert="horz" lIns="91440" tIns="45720" rIns="91440" bIns="45720" rtlCol="0"/>
+          <a:lstStyle/>
+          <a:p>
+            <a:pPr lvl="0"/>
+            <a:r>
+              <a:rPr lang="en-US"/>
+              <a:t>Click to edit Master text styles</a:t>
+            </a:r>
+          </a:p>
+          <a:p>
+            <a:pPr lvl="1"/>
+            <a:r>
+              <a:rPr lang="en-US"/>
+              <a:t>Second level</a:t>
+            </a:r>
+          </a:p>
+          <a:p>
+            <a:pPr lvl="2"/>
+            <a:r>
+              <a:rPr lang="en-US"/>
+              <a:t>Third level</a:t>
+            </a:r>
+          </a:p>
+          <a:p>
+            <a:pPr lvl="3"/>
+            <a:r>
+              <a:rPr lang="en-US"/>
+              <a:t>Fourth level</a:t>
+            </a:r>
+          </a:p>
+          <a:p>
+            <a:pPr lvl="4"/>
+            <a:r>
+              <a:rPr lang="en-US"/>
+              <a:t>Fifth level</a:t>
+            </a:r>
+            <a:endParaRPr lang="en-AU"/>
+          </a:p>
+        </p:txBody>
+      </p:sp>
+      <p:sp>
+        <p:nvSpPr>
+          <p:cNvPr id="6" name="Footer Placeholder 5"/>
+          <p:cNvSpPr>
+            <a:spLocks noGrp="1"/>
+          </p:cNvSpPr>
+          <p:nvPr>
+            <p:ph type="ftr" sz="quarter" idx="4"/>
+          </p:nvPr>
+        </p:nvSpPr>
+        <p:spPr>
+          <a:xfrm>
+            <a:off x="0" y="8685213"/>
+            <a:ext cx="2971800" cy="458787"/>
+          </a:xfrm>
+          <a:prstGeom prst="rect">
+            <a:avLst/>
+          </a:prstGeom>
+        </p:spPr>
+        <p:txBody>
+          <a:bodyPr vert="horz" lIns="91440" tIns="45720" rIns="91440" bIns="45720" rtlCol="0" anchor="b"/>
+          <a:lstStyle>
+            <a:lvl1pPr algn="l">
+              <a:defRPr sz="1200"/>
+            </a:lvl1pPr>
+          </a:lstStyle>
+          <a:p>
+            <a:endParaRPr lang="en-AU"/>
+          </a:p>
+        </p:txBody>
+      </p:sp>
+      <p:sp>
+        <p:nvSpPr>
+          <p:cNvPr id="7" name="Slide Number Placeholder 6"/>
+          <p:cNvSpPr>
+            <a:spLocks noGrp="1"/>
+          </p:cNvSpPr>
+          <p:nvPr>
+            <p:ph type="sldNum" sz="quarter" idx="5"/>
+          </p:nvPr>
+        </p:nvSpPr>
+        <p:spPr>
+          <a:xfrm>
+            <a:off x="3884613" y="8685213"/>
+            <a:ext cx="2971800" cy="458787"/>
+          </a:xfrm>
+          <a:prstGeom prst="rect">
+            <a:avLst/>
+          </a:prstGeom>
+        </p:spPr>
+        <p:txBody>
+          <a:bodyPr vert="horz" lIns="91440" tIns="45720" rIns="91440" bIns="45720" rtlCol="0" anchor="b"/>
+          <a:lstStyle>
+            <a:lvl1pPr algn="r">
+              <a:defRPr sz="1200"/>
+            </a:lvl1pPr>
+          </a:lstStyle>
+          <a:p>
+            <a:fld id="{38F5A474-F326-4EFF-8295-93EFB5278FB2}" type="slidenum">
+              <a:rPr lang="en-AU" smtClean="0"/>
+              <a:t>‹#›</a:t>
+            </a:fld>
+            <a:endParaRPr lang="en-AU"/>
+          </a:p>
+        </p:txBody>
+      </p:sp>
+    </p:spTree>
+    <p:extLst>
+      <p:ext uri="{BB962C8B-B14F-4D97-AF65-F5344CB8AC3E}">
+        <p14:creationId xmlns:p14="http://schemas.microsoft.com/office/powerpoint/2010/main" val="1972025799"/>
+      </p:ext>
+    </p:extLst>
+  </p:cSld>
+  <p:clrMap bg1="lt1" tx1="dk1" bg2="lt2" tx2="dk2" accent1="accent1" accent2="accent2" accent3="accent3" accent4="accent4" accent5="accent5" accent6="accent6" hlink="hlink" folHlink="folHlink"/>
+  <p:notesStyle>
+    <a:lvl1pPr marL="0" algn="l" defTabSz="914400" rtl="0" eaLnBrk="1" latinLnBrk="0" hangingPunct="1">
+      <a:defRPr sz="1200" kern="1200">
+        <a:solidFill>
+          <a:schemeClr val="tx1"/>
+        </a:solidFill>
+        <a:latin typeface="+mn-lt"/>
+        <a:ea typeface="+mn-ea"/>
+        <a:cs typeface="+mn-cs"/>
+      </a:defRPr>
+    </a:lvl1pPr>
+    <a:lvl2pPr marL="457200" algn="l" defTabSz="914400" rtl="0" eaLnBrk="1" latinLnBrk="0" hangingPunct="1">
+      <a:defRPr sz="1200" kern="1200">
+        <a:solidFill>
+          <a:schemeClr val="tx1"/>
+        </a:solidFill>
+        <a:latin typeface="+mn-lt"/>
+        <a:ea typeface="+mn-ea"/>
+        <a:cs typeface="+mn-cs"/>
+      </a:defRPr>
+    </a:lvl2pPr>
+    <a:lvl3pPr marL="914400" algn="l" defTabSz="914400" rtl="0" eaLnBrk="1" latinLnBrk="0" hangingPunct="1">
+      <a:defRPr sz="1200" kern="1200">
+        <a:solidFill>
+          <a:schemeClr val="tx1"/>
+        </a:solidFill>
+        <a:latin typeface="+mn-lt"/>
+        <a:ea typeface="+mn-ea"/>
+        <a:cs typeface="+mn-cs"/>
+      </a:defRPr>
+    </a:lvl3pPr>
+    <a:lvl4pPr marL="1371600" algn="l" defTabSz="914400" rtl="0" eaLnBrk="1" latinLnBrk="0" hangingPunct="1">
+      <a:defRPr sz="1200" kern="1200">
+        <a:solidFill>
+          <a:schemeClr val="tx1"/>
+        </a:solidFill>
+        <a:latin typeface="+mn-lt"/>
+        <a:ea typeface="+mn-ea"/>
+        <a:cs typeface="+mn-cs"/>
+      </a:defRPr>
+    </a:lvl4pPr>
+    <a:lvl5pPr marL="1828800" algn="l" defTabSz="914400" rtl="0" eaLnBrk="1" latinLnBrk="0" hangingPunct="1">
+      <a:defRPr sz="1200" kern="1200">
+        <a:solidFill>
+          <a:schemeClr val="tx1"/>
+        </a:solidFill>
+        <a:latin typeface="+mn-lt"/>
+        <a:ea typeface="+mn-ea"/>
+        <a:cs typeface="+mn-cs"/>
+      </a:defRPr>
+    </a:lvl5pPr>
+    <a:lvl6pPr marL="2286000" algn="l" defTabSz="914400" rtl="0" eaLnBrk="1" latinLnBrk="0" hangingPunct="1">
+      <a:defRPr sz="1200" kern="1200">
+        <a:solidFill>
+          <a:schemeClr val="tx1"/>
+        </a:solidFill>
+        <a:latin typeface="+mn-lt"/>
+        <a:ea typeface="+mn-ea"/>
+        <a:cs typeface="+mn-cs"/>
+      </a:defRPr>
+    </a:lvl6pPr>
+    <a:lvl7pPr marL="2743200" algn="l" defTabSz="914400" rtl="0" eaLnBrk="1" latinLnBrk="0" hangingPunct="1">
+      <a:defRPr sz="1200" kern="1200">
+        <a:solidFill>
+          <a:schemeClr val="tx1"/>
+        </a:solidFill>
+        <a:latin typeface="+mn-lt"/>
+        <a:ea typeface="+mn-ea"/>
+        <a:cs typeface="+mn-cs"/>
+      </a:defRPr>
+    </a:lvl7pPr>
+    <a:lvl8pPr marL="3200400" algn="l" defTabSz="914400" rtl="0" eaLnBrk="1" latinLnBrk="0" hangingPunct="1">
+      <a:defRPr sz="1200" kern="1200">
+        <a:solidFill>
+          <a:schemeClr val="tx1"/>
+        </a:solidFill>
+        <a:latin typeface="+mn-lt"/>
+        <a:ea typeface="+mn-ea"/>
+        <a:cs typeface="+mn-cs"/>
+      </a:defRPr>
+    </a:lvl8pPr>
+    <a:lvl9pPr marL="3657600" algn="l" defTabSz="914400" rtl="0" eaLnBrk="1" latinLnBrk="0" hangingPunct="1">
+      <a:defRPr sz="1200" kern="1200">
+        <a:solidFill>
+          <a:schemeClr val="tx1"/>
+        </a:solidFill>
+        <a:latin typeface="+mn-lt"/>
+        <a:ea typeface="+mn-ea"/>
+        <a:cs typeface="+mn-cs"/>
+      </a:defRPr>
+    </a:lvl9pPr>
+  </p:notesStyle>
+</p:notesMaster>
+</file>
+
+<file path=ppt/notesSlides/notesSlide1.xml><?xml version="1.0" encoding="utf-8"?>
+<p:notes xmlns:a="http://schemas.openxmlformats.org/drawingml/2006/main" xmlns:r="http://schemas.openxmlformats.org/officeDocument/2006/relationships" xmlns:p="http://schemas.openxmlformats.org/presentationml/2006/main">
+  <p:cSld>
+    <p:spTree>
+      <p:nvGrpSpPr>
+        <p:cNvPr id="1" name=""/>
+        <p:cNvGrpSpPr/>
+        <p:nvPr/>
+      </p:nvGrpSpPr>
+      <p:grpSpPr>
+        <a:xfrm>
+          <a:off x="0" y="0"/>
+          <a:ext cx="0" cy="0"/>
+          <a:chOff x="0" y="0"/>
+          <a:chExt cx="0" cy="0"/>
+        </a:xfrm>
+      </p:grpSpPr>
+      <p:sp>
+        <p:nvSpPr>
+          <p:cNvPr id="2" name="Slide Image Placeholder 1"/>
+          <p:cNvSpPr>
+            <a:spLocks noGrp="1" noRot="1" noChangeAspect="1"/>
+          </p:cNvSpPr>
+          <p:nvPr>
+            <p:ph type="sldImg"/>
+          </p:nvPr>
+        </p:nvSpPr>
+        <p:spPr/>
+      </p:sp>
+      <p:sp>
+        <p:nvSpPr>
+          <p:cNvPr id="3" name="Notes Placeholder 2"/>
+          <p:cNvSpPr>
+            <a:spLocks noGrp="1"/>
+          </p:cNvSpPr>
+          <p:nvPr>
+            <p:ph type="body" idx="1"/>
+          </p:nvPr>
+        </p:nvSpPr>
+        <p:spPr/>
+        <p:txBody>
+          <a:bodyPr/>
+          <a:lstStyle/>
+          <a:p>
+            <a:r>
+              <a:rPr lang="en-US" dirty="0"/>
+              <a:t>What is Namespace pollution?</a:t>
+            </a:r>
+          </a:p>
+          <a:p>
+            <a:pPr marL="171450" indent="-171450">
+              <a:buFont typeface="Arial" panose="020B0604020202020204" pitchFamily="34" charset="0"/>
+              <a:buChar char="•"/>
+            </a:pPr>
+            <a:r>
+              <a:rPr lang="en-US" dirty="0"/>
+              <a:t>Having lots of variable names floating around that you’re not using</a:t>
+            </a:r>
+          </a:p>
+          <a:p>
+            <a:pPr marL="171450" indent="-171450">
+              <a:buFont typeface="Arial" panose="020B0604020202020204" pitchFamily="34" charset="0"/>
+              <a:buChar char="•"/>
+            </a:pPr>
+            <a:r>
+              <a:rPr lang="en-US" dirty="0"/>
+              <a:t>Could be from importing packages – end up writing over some of their functions, then it’s unclear what’s being used</a:t>
+            </a:r>
+          </a:p>
+          <a:p>
+            <a:pPr marL="171450" indent="-171450">
+              <a:buFont typeface="Arial" panose="020B0604020202020204" pitchFamily="34" charset="0"/>
+              <a:buChar char="•"/>
+            </a:pPr>
+            <a:r>
+              <a:rPr lang="en-US" dirty="0"/>
+              <a:t>Could be from using lots of global variables yourself – they’re now running wild out in your coding environment, so how do you keep them fenced in?</a:t>
+            </a:r>
+          </a:p>
+          <a:p>
+            <a:pPr marL="171450" indent="-171450">
+              <a:buFont typeface="Arial" panose="020B0604020202020204" pitchFamily="34" charset="0"/>
+              <a:buChar char="•"/>
+            </a:pPr>
+            <a:endParaRPr lang="en-US" dirty="0"/>
+          </a:p>
+          <a:p>
+            <a:r>
+              <a:rPr lang="en-US" dirty="0"/>
+              <a:t>How does it cause me trouble?</a:t>
+            </a:r>
+          </a:p>
+          <a:p>
+            <a:pPr marL="171450" indent="-171450">
+              <a:buFont typeface="Arial" panose="020B0604020202020204" pitchFamily="34" charset="0"/>
+              <a:buChar char="•"/>
+            </a:pPr>
+            <a:r>
+              <a:rPr lang="en-US" dirty="0"/>
+              <a:t>Didn’t realize that was still out there?</a:t>
+            </a:r>
+          </a:p>
+          <a:p>
+            <a:pPr marL="171450" indent="-171450">
+              <a:buFont typeface="Arial" panose="020B0604020202020204" pitchFamily="34" charset="0"/>
+              <a:buChar char="•"/>
+            </a:pPr>
+            <a:r>
+              <a:rPr lang="en-US" dirty="0"/>
+              <a:t>I reused that a couple of times – which one is this?</a:t>
+            </a:r>
+          </a:p>
+          <a:p>
+            <a:pPr marL="0" indent="0">
+              <a:buFont typeface="Arial" panose="020B0604020202020204" pitchFamily="34" charset="0"/>
+              <a:buNone/>
+            </a:pPr>
+            <a:endParaRPr lang="en-US" dirty="0"/>
+          </a:p>
+          <a:p>
+            <a:r>
+              <a:rPr lang="en-US" dirty="0"/>
+              <a:t>Why are notebooks a little more risk in this area?</a:t>
+            </a:r>
+          </a:p>
+          <a:p>
+            <a:pPr marL="171450" indent="-171450">
+              <a:buFont typeface="Arial" panose="020B0604020202020204" pitchFamily="34" charset="0"/>
+              <a:buChar char="•"/>
+            </a:pPr>
+            <a:r>
+              <a:rPr lang="en-US" dirty="0"/>
+              <a:t>Saving things for you – very helpful of them…</a:t>
+            </a:r>
+          </a:p>
+          <a:p>
+            <a:pPr marL="171450" indent="-171450">
+              <a:buFont typeface="Arial" panose="020B0604020202020204" pitchFamily="34" charset="0"/>
+              <a:buChar char="•"/>
+            </a:pPr>
+            <a:endParaRPr lang="en-US" dirty="0"/>
+          </a:p>
+          <a:p>
+            <a:pPr marL="171450" indent="-171450">
+              <a:buFont typeface="Arial" panose="020B0604020202020204" pitchFamily="34" charset="0"/>
+              <a:buChar char="•"/>
+            </a:pPr>
+            <a:r>
+              <a:rPr lang="en-US" dirty="0"/>
+              <a:t>Image by &lt;a </a:t>
+            </a:r>
+            <a:r>
+              <a:rPr lang="en-US" dirty="0" err="1"/>
+              <a:t>href</a:t>
+            </a:r>
+            <a:r>
+              <a:rPr lang="en-US" dirty="0"/>
+              <a:t>="https://pixabay.com/users/Bellinon-2931390/?</a:t>
+            </a:r>
+            <a:r>
+              <a:rPr lang="en-US" dirty="0" err="1"/>
+              <a:t>utm_source</a:t>
+            </a:r>
+            <a:r>
+              <a:rPr lang="en-US" dirty="0"/>
+              <a:t>=</a:t>
+            </a:r>
+            <a:r>
+              <a:rPr lang="en-US" dirty="0" err="1"/>
+              <a:t>link-attribution&amp;amp;utm_medium</a:t>
+            </a:r>
+            <a:r>
+              <a:rPr lang="en-US" dirty="0"/>
+              <a:t>=</a:t>
+            </a:r>
+            <a:r>
+              <a:rPr lang="en-US" dirty="0" err="1"/>
+              <a:t>referral&amp;amp;utm_campaign</a:t>
+            </a:r>
+            <a:r>
+              <a:rPr lang="en-US" dirty="0"/>
+              <a:t>=</a:t>
+            </a:r>
+            <a:r>
+              <a:rPr lang="en-US" dirty="0" err="1"/>
+              <a:t>image&amp;amp;utm_content</a:t>
+            </a:r>
+            <a:r>
+              <a:rPr lang="en-US" dirty="0"/>
+              <a:t>=4271569"&gt;</a:t>
+            </a:r>
+            <a:r>
+              <a:rPr lang="en-US" dirty="0" err="1"/>
+              <a:t>Bellinon</a:t>
+            </a:r>
+            <a:r>
+              <a:rPr lang="en-US" dirty="0"/>
+              <a:t>&lt;/a&gt; from &lt;a </a:t>
+            </a:r>
+            <a:r>
+              <a:rPr lang="en-US" dirty="0" err="1"/>
+              <a:t>href</a:t>
+            </a:r>
+            <a:r>
+              <a:rPr lang="en-US" dirty="0"/>
+              <a:t>="https://pixabay.com/?</a:t>
+            </a:r>
+            <a:r>
+              <a:rPr lang="en-US" dirty="0" err="1"/>
+              <a:t>utm_source</a:t>
+            </a:r>
+            <a:r>
+              <a:rPr lang="en-US" dirty="0"/>
+              <a:t>=</a:t>
+            </a:r>
+            <a:r>
+              <a:rPr lang="en-US" dirty="0" err="1"/>
+              <a:t>link-attribution&amp;amp;utm_medium</a:t>
+            </a:r>
+            <a:r>
+              <a:rPr lang="en-US" dirty="0"/>
+              <a:t>=</a:t>
+            </a:r>
+            <a:r>
+              <a:rPr lang="en-US" dirty="0" err="1"/>
+              <a:t>referral&amp;amp;utm_campaign</a:t>
+            </a:r>
+            <a:r>
+              <a:rPr lang="en-US" dirty="0"/>
+              <a:t>=</a:t>
+            </a:r>
+            <a:r>
+              <a:rPr lang="en-US" dirty="0" err="1"/>
+              <a:t>image&amp;amp;utm_content</a:t>
+            </a:r>
+            <a:r>
+              <a:rPr lang="en-US" dirty="0"/>
+              <a:t>=4271569"&gt;</a:t>
+            </a:r>
+            <a:r>
+              <a:rPr lang="en-US" dirty="0" err="1"/>
+              <a:t>Pixabay</a:t>
+            </a:r>
+            <a:r>
+              <a:rPr lang="en-US" dirty="0"/>
+              <a:t>&lt;/a&gt;</a:t>
+            </a:r>
+          </a:p>
+          <a:p>
+            <a:pPr marL="171450" indent="-171450">
+              <a:buFont typeface="Arial" panose="020B0604020202020204" pitchFamily="34" charset="0"/>
+              <a:buChar char="•"/>
+            </a:pPr>
+            <a:endParaRPr lang="en-US" dirty="0"/>
+          </a:p>
+          <a:p>
+            <a:pPr marL="171450" indent="-171450">
+              <a:buFont typeface="Arial" panose="020B0604020202020204" pitchFamily="34" charset="0"/>
+              <a:buChar char="•"/>
+            </a:pPr>
+            <a:r>
+              <a:rPr lang="en-AU">
+                <a:hlinkClick r:id="rId3"/>
+              </a:rPr>
+              <a:t>https://pixabay.com/users/graphicmama-team-2641041</a:t>
+            </a:r>
+            <a:endParaRPr lang="en-AU" dirty="0"/>
+          </a:p>
+        </p:txBody>
+      </p:sp>
+      <p:sp>
+        <p:nvSpPr>
+          <p:cNvPr id="4" name="Slide Number Placeholder 3"/>
+          <p:cNvSpPr>
+            <a:spLocks noGrp="1"/>
+          </p:cNvSpPr>
+          <p:nvPr>
+            <p:ph type="sldNum" sz="quarter" idx="5"/>
+          </p:nvPr>
+        </p:nvSpPr>
+        <p:spPr/>
+        <p:txBody>
+          <a:bodyPr/>
+          <a:lstStyle/>
+          <a:p>
+            <a:fld id="{38F5A474-F326-4EFF-8295-93EFB5278FB2}" type="slidenum">
+              <a:rPr lang="en-AU" smtClean="0"/>
+              <a:t>6</a:t>
+            </a:fld>
+            <a:endParaRPr lang="en-AU"/>
+          </a:p>
+        </p:txBody>
+      </p:sp>
+    </p:spTree>
+    <p:extLst>
+      <p:ext uri="{BB962C8B-B14F-4D97-AF65-F5344CB8AC3E}">
+        <p14:creationId xmlns:p14="http://schemas.microsoft.com/office/powerpoint/2010/main" val="1771913228"/>
+      </p:ext>
+    </p:extLst>
+  </p:cSld>
+  <p:clrMapOvr>
+    <a:masterClrMapping/>
+  </p:clrMapOvr>
+</p:notes>
 </file>
 
 <file path=ppt/slideLayouts/slideLayout1.xml><?xml version="1.0" encoding="utf-8"?>
@@ -3491,7 +4153,7 @@
           <a:p>
             <a:r>
               <a:rPr lang="en-US" dirty="0"/>
-              <a:t>Uh Oh #3: I don’t need a package, but can I re-use that thing I did over there?</a:t>
+              <a:t>Uh Oh #3: Hang on, you want me to do this again? (I thought I was just exploring…)</a:t>
             </a:r>
             <a:endParaRPr lang="en-AU" dirty="0"/>
           </a:p>
@@ -3519,15 +4181,26 @@
           <a:lstStyle/>
           <a:p>
             <a:r>
-              <a:rPr lang="en-US" dirty="0" err="1"/>
-              <a:t>sys.path.append</a:t>
-            </a:r>
-            <a:r>
-              <a:rPr lang="en-US" dirty="0"/>
-              <a:t>()</a:t>
-            </a:r>
-          </a:p>
-          <a:p>
+              <a:rPr lang="en-US" dirty="0"/>
+              <a:t>I can barely follow what I did, although I think it’s right</a:t>
+            </a:r>
+          </a:p>
+          <a:p>
+            <a:r>
+              <a:rPr lang="en-US" dirty="0"/>
+              <a:t>Which bits to I actually need?</a:t>
+            </a:r>
+          </a:p>
+          <a:p>
+            <a:r>
+              <a:rPr lang="en-US" dirty="0"/>
+              <a:t>How can I see this more clearly?</a:t>
+            </a:r>
+          </a:p>
+          <a:p>
+            <a:pPr marL="0" indent="0">
+              <a:buNone/>
+            </a:pPr>
             <a:endParaRPr lang="en-AU" dirty="0"/>
           </a:p>
         </p:txBody>
@@ -3535,7 +4208,7 @@
     </p:spTree>
     <p:extLst>
       <p:ext uri="{BB962C8B-B14F-4D97-AF65-F5344CB8AC3E}">
-        <p14:creationId xmlns:p14="http://schemas.microsoft.com/office/powerpoint/2010/main" val="1257776886"/>
+        <p14:creationId xmlns:p14="http://schemas.microsoft.com/office/powerpoint/2010/main" val="2045783324"/>
       </p:ext>
     </p:extLst>
   </p:cSld>
@@ -3564,28 +4237,28 @@
       </p:grpSpPr>
       <p:sp>
         <p:nvSpPr>
-          <p:cNvPr id="5" name="Content Placeholder 4">
-            <a:extLst>
-              <a:ext uri="{FF2B5EF4-FFF2-40B4-BE49-F238E27FC236}">
-                <a16:creationId xmlns:a16="http://schemas.microsoft.com/office/drawing/2014/main" id="{4B49ED77-0BE2-4780-83AE-757E60C73DEB}"/>
-              </a:ext>
-            </a:extLst>
-          </p:cNvPr>
-          <p:cNvSpPr>
-            <a:spLocks noGrp="1"/>
-          </p:cNvSpPr>
-          <p:nvPr>
-            <p:ph sz="half" idx="1"/>
-          </p:nvPr>
-        </p:nvSpPr>
-        <p:spPr/>
-        <p:txBody>
-          <a:bodyPr/>
-          <a:lstStyle/>
-          <a:p>
-            <a:r>
-              <a:rPr lang="en-US" dirty="0"/>
-              <a:t>Tips!</a:t>
+          <p:cNvPr id="2" name="Title 1">
+            <a:extLst>
+              <a:ext uri="{FF2B5EF4-FFF2-40B4-BE49-F238E27FC236}">
+                <a16:creationId xmlns:a16="http://schemas.microsoft.com/office/drawing/2014/main" id="{CB635212-EA69-4883-B617-2D2F79B16339}"/>
+              </a:ext>
+            </a:extLst>
+          </p:cNvPr>
+          <p:cNvSpPr>
+            <a:spLocks noGrp="1"/>
+          </p:cNvSpPr>
+          <p:nvPr>
+            <p:ph type="title"/>
+          </p:nvPr>
+        </p:nvSpPr>
+        <p:spPr/>
+        <p:txBody>
+          <a:bodyPr/>
+          <a:lstStyle/>
+          <a:p>
+            <a:r>
+              <a:rPr lang="en-US" dirty="0"/>
+              <a:t>Uh Oh #4: This takes forever to load. How did it get so long?</a:t>
             </a:r>
             <a:endParaRPr lang="en-AU" dirty="0"/>
           </a:p>
@@ -3593,24 +4266,39 @@
       </p:sp>
       <p:sp>
         <p:nvSpPr>
-          <p:cNvPr id="6" name="Content Placeholder 5">
-            <a:extLst>
-              <a:ext uri="{FF2B5EF4-FFF2-40B4-BE49-F238E27FC236}">
-                <a16:creationId xmlns:a16="http://schemas.microsoft.com/office/drawing/2014/main" id="{F95B41C1-24D5-4CAD-9930-5330D64715B2}"/>
-              </a:ext>
-            </a:extLst>
-          </p:cNvPr>
-          <p:cNvSpPr>
-            <a:spLocks noGrp="1"/>
-          </p:cNvSpPr>
-          <p:nvPr>
-            <p:ph sz="half" idx="2"/>
-          </p:nvPr>
-        </p:nvSpPr>
-        <p:spPr/>
-        <p:txBody>
-          <a:bodyPr/>
-          <a:lstStyle/>
+          <p:cNvPr id="3" name="Content Placeholder 2">
+            <a:extLst>
+              <a:ext uri="{FF2B5EF4-FFF2-40B4-BE49-F238E27FC236}">
+                <a16:creationId xmlns:a16="http://schemas.microsoft.com/office/drawing/2014/main" id="{53CAC3CD-AE87-4C90-88E4-BBAE897CDC20}"/>
+              </a:ext>
+            </a:extLst>
+          </p:cNvPr>
+          <p:cNvSpPr>
+            <a:spLocks noGrp="1"/>
+          </p:cNvSpPr>
+          <p:nvPr>
+            <p:ph idx="1"/>
+          </p:nvPr>
+        </p:nvSpPr>
+        <p:spPr/>
+        <p:txBody>
+          <a:bodyPr/>
+          <a:lstStyle/>
+          <a:p>
+            <a:r>
+              <a:rPr lang="en-US" dirty="0"/>
+              <a:t>Sometimes related to :up</a:t>
+            </a:r>
+          </a:p>
+          <a:p>
+            <a:r>
+              <a:rPr lang="en-AU" dirty="0">
+                <a:hlinkClick r:id="rId2"/>
+              </a:rPr>
+              <a:t>https://github.com/LydiaPeabody/Portfolio/blob/master/Capstone_JD_Gender_Analysis/job_description_gender_analysis.ipynb</a:t>
+            </a:r>
+            <a:endParaRPr lang="en-US" dirty="0"/>
+          </a:p>
           <a:p>
             <a:endParaRPr lang="en-AU" dirty="0"/>
           </a:p>
@@ -3619,7 +4307,7 @@
     </p:spTree>
     <p:extLst>
       <p:ext uri="{BB962C8B-B14F-4D97-AF65-F5344CB8AC3E}">
-        <p14:creationId xmlns:p14="http://schemas.microsoft.com/office/powerpoint/2010/main" val="3239995260"/>
+        <p14:creationId xmlns:p14="http://schemas.microsoft.com/office/powerpoint/2010/main" val="3113171964"/>
       </p:ext>
     </p:extLst>
   </p:cSld>
@@ -3648,28 +4336,28 @@
       </p:grpSpPr>
       <p:sp>
         <p:nvSpPr>
-          <p:cNvPr id="2" name="Title 1">
-            <a:extLst>
-              <a:ext uri="{FF2B5EF4-FFF2-40B4-BE49-F238E27FC236}">
-                <a16:creationId xmlns:a16="http://schemas.microsoft.com/office/drawing/2014/main" id="{CB635212-EA69-4883-B617-2D2F79B16339}"/>
-              </a:ext>
-            </a:extLst>
-          </p:cNvPr>
-          <p:cNvSpPr>
-            <a:spLocks noGrp="1"/>
-          </p:cNvSpPr>
-          <p:nvPr>
-            <p:ph type="title"/>
-          </p:nvPr>
-        </p:nvSpPr>
-        <p:spPr/>
-        <p:txBody>
-          <a:bodyPr/>
-          <a:lstStyle/>
-          <a:p>
-            <a:r>
-              <a:rPr lang="en-US" dirty="0"/>
-              <a:t>Uh Oh #4: Where’d that thing come from?</a:t>
+          <p:cNvPr id="5" name="Content Placeholder 4">
+            <a:extLst>
+              <a:ext uri="{FF2B5EF4-FFF2-40B4-BE49-F238E27FC236}">
+                <a16:creationId xmlns:a16="http://schemas.microsoft.com/office/drawing/2014/main" id="{4B49ED77-0BE2-4780-83AE-757E60C73DEB}"/>
+              </a:ext>
+            </a:extLst>
+          </p:cNvPr>
+          <p:cNvSpPr>
+            <a:spLocks noGrp="1"/>
+          </p:cNvSpPr>
+          <p:nvPr>
+            <p:ph sz="half" idx="1"/>
+          </p:nvPr>
+        </p:nvSpPr>
+        <p:spPr/>
+        <p:txBody>
+          <a:bodyPr/>
+          <a:lstStyle/>
+          <a:p>
+            <a:r>
+              <a:rPr lang="en-US" dirty="0"/>
+              <a:t>Tips!</a:t>
             </a:r>
             <a:endParaRPr lang="en-AU" dirty="0"/>
           </a:p>
@@ -3677,33 +4365,33 @@
       </p:sp>
       <p:sp>
         <p:nvSpPr>
-          <p:cNvPr id="3" name="Content Placeholder 2">
-            <a:extLst>
-              <a:ext uri="{FF2B5EF4-FFF2-40B4-BE49-F238E27FC236}">
-                <a16:creationId xmlns:a16="http://schemas.microsoft.com/office/drawing/2014/main" id="{53CAC3CD-AE87-4C90-88E4-BBAE897CDC20}"/>
-              </a:ext>
-            </a:extLst>
-          </p:cNvPr>
-          <p:cNvSpPr>
-            <a:spLocks noGrp="1"/>
-          </p:cNvSpPr>
-          <p:nvPr>
-            <p:ph idx="1"/>
-          </p:nvPr>
-        </p:nvSpPr>
-        <p:spPr/>
-        <p:txBody>
-          <a:bodyPr/>
-          <a:lstStyle/>
-          <a:p>
-            <a:endParaRPr lang="en-AU"/>
+          <p:cNvPr id="6" name="Content Placeholder 5">
+            <a:extLst>
+              <a:ext uri="{FF2B5EF4-FFF2-40B4-BE49-F238E27FC236}">
+                <a16:creationId xmlns:a16="http://schemas.microsoft.com/office/drawing/2014/main" id="{F95B41C1-24D5-4CAD-9930-5330D64715B2}"/>
+              </a:ext>
+            </a:extLst>
+          </p:cNvPr>
+          <p:cNvSpPr>
+            <a:spLocks noGrp="1"/>
+          </p:cNvSpPr>
+          <p:nvPr>
+            <p:ph sz="half" idx="2"/>
+          </p:nvPr>
+        </p:nvSpPr>
+        <p:spPr/>
+        <p:txBody>
+          <a:bodyPr/>
+          <a:lstStyle/>
+          <a:p>
+            <a:endParaRPr lang="en-AU" dirty="0"/>
           </a:p>
         </p:txBody>
       </p:sp>
     </p:spTree>
     <p:extLst>
       <p:ext uri="{BB962C8B-B14F-4D97-AF65-F5344CB8AC3E}">
-        <p14:creationId xmlns:p14="http://schemas.microsoft.com/office/powerpoint/2010/main" val="2859488379"/>
+        <p14:creationId xmlns:p14="http://schemas.microsoft.com/office/powerpoint/2010/main" val="2751019548"/>
       </p:ext>
     </p:extLst>
   </p:cSld>
@@ -3787,7 +4475,7 @@
     </p:spTree>
     <p:extLst>
       <p:ext uri="{BB962C8B-B14F-4D97-AF65-F5344CB8AC3E}">
-        <p14:creationId xmlns:p14="http://schemas.microsoft.com/office/powerpoint/2010/main" val="1655521303"/>
+        <p14:creationId xmlns:p14="http://schemas.microsoft.com/office/powerpoint/2010/main" val="3291933465"/>
       </p:ext>
     </p:extLst>
   </p:cSld>
@@ -3837,7 +4525,7 @@
           <a:p>
             <a:r>
               <a:rPr lang="en-US" dirty="0"/>
-              <a:t>Uh Oh #4: Where’d that thing come from?</a:t>
+              <a:t>Uh Oh #5: Scripts sound useful, but I’m not confident with terminal</a:t>
             </a:r>
             <a:endParaRPr lang="en-AU" dirty="0"/>
           </a:p>
@@ -3864,14 +4552,30 @@
           <a:bodyPr/>
           <a:lstStyle/>
           <a:p>
-            <a:endParaRPr lang="en-AU"/>
+            <a:r>
+              <a:rPr lang="en-US" dirty="0"/>
+              <a:t>I’m going to waste so much time</a:t>
+            </a:r>
+          </a:p>
+          <a:p>
+            <a:r>
+              <a:rPr lang="en-US" dirty="0"/>
+              <a:t>My troubleshooting is slower</a:t>
+            </a:r>
+          </a:p>
+          <a:p>
+            <a:r>
+              <a:rPr lang="en-US" dirty="0"/>
+              <a:t>It’s so scary I just don’t want to go there yet</a:t>
+            </a:r>
+            <a:endParaRPr lang="en-AU" dirty="0"/>
           </a:p>
         </p:txBody>
       </p:sp>
     </p:spTree>
     <p:extLst>
       <p:ext uri="{BB962C8B-B14F-4D97-AF65-F5344CB8AC3E}">
-        <p14:creationId xmlns:p14="http://schemas.microsoft.com/office/powerpoint/2010/main" val="3113171964"/>
+        <p14:creationId xmlns:p14="http://schemas.microsoft.com/office/powerpoint/2010/main" val="4289203544"/>
       </p:ext>
     </p:extLst>
   </p:cSld>
@@ -3955,7 +4659,310 @@
     </p:spTree>
     <p:extLst>
       <p:ext uri="{BB962C8B-B14F-4D97-AF65-F5344CB8AC3E}">
-        <p14:creationId xmlns:p14="http://schemas.microsoft.com/office/powerpoint/2010/main" val="3291933465"/>
+        <p14:creationId xmlns:p14="http://schemas.microsoft.com/office/powerpoint/2010/main" val="1318217686"/>
+      </p:ext>
+    </p:extLst>
+  </p:cSld>
+  <p:clrMapOvr>
+    <a:masterClrMapping/>
+  </p:clrMapOvr>
+</p:sld>
+</file>
+
+<file path=ppt/slides/slide16.xml><?xml version="1.0" encoding="utf-8"?>
+<p:sld xmlns:a="http://schemas.openxmlformats.org/drawingml/2006/main" xmlns:r="http://schemas.openxmlformats.org/officeDocument/2006/relationships" xmlns:p="http://schemas.openxmlformats.org/presentationml/2006/main">
+  <p:cSld>
+    <p:spTree>
+      <p:nvGrpSpPr>
+        <p:cNvPr id="1" name=""/>
+        <p:cNvGrpSpPr/>
+        <p:nvPr/>
+      </p:nvGrpSpPr>
+      <p:grpSpPr>
+        <a:xfrm>
+          <a:off x="0" y="0"/>
+          <a:ext cx="0" cy="0"/>
+          <a:chOff x="0" y="0"/>
+          <a:chExt cx="0" cy="0"/>
+        </a:xfrm>
+      </p:grpSpPr>
+      <p:sp>
+        <p:nvSpPr>
+          <p:cNvPr id="2" name="Title 1">
+            <a:extLst>
+              <a:ext uri="{FF2B5EF4-FFF2-40B4-BE49-F238E27FC236}">
+                <a16:creationId xmlns:a16="http://schemas.microsoft.com/office/drawing/2014/main" id="{CB635212-EA69-4883-B617-2D2F79B16339}"/>
+              </a:ext>
+            </a:extLst>
+          </p:cNvPr>
+          <p:cNvSpPr>
+            <a:spLocks noGrp="1"/>
+          </p:cNvSpPr>
+          <p:nvPr>
+            <p:ph type="title"/>
+          </p:nvPr>
+        </p:nvSpPr>
+        <p:spPr/>
+        <p:txBody>
+          <a:bodyPr/>
+          <a:lstStyle/>
+          <a:p>
+            <a:r>
+              <a:rPr lang="en-US" dirty="0"/>
+              <a:t>Uh Oh #6: I don’t need a package, but can I re-use that thing I did over there?</a:t>
+            </a:r>
+            <a:endParaRPr lang="en-AU" dirty="0"/>
+          </a:p>
+        </p:txBody>
+      </p:sp>
+      <p:sp>
+        <p:nvSpPr>
+          <p:cNvPr id="3" name="Content Placeholder 2">
+            <a:extLst>
+              <a:ext uri="{FF2B5EF4-FFF2-40B4-BE49-F238E27FC236}">
+                <a16:creationId xmlns:a16="http://schemas.microsoft.com/office/drawing/2014/main" id="{53CAC3CD-AE87-4C90-88E4-BBAE897CDC20}"/>
+              </a:ext>
+            </a:extLst>
+          </p:cNvPr>
+          <p:cNvSpPr>
+            <a:spLocks noGrp="1"/>
+          </p:cNvSpPr>
+          <p:nvPr>
+            <p:ph idx="1"/>
+          </p:nvPr>
+        </p:nvSpPr>
+        <p:spPr/>
+        <p:txBody>
+          <a:bodyPr/>
+          <a:lstStyle/>
+          <a:p>
+            <a:r>
+              <a:rPr lang="en-US" dirty="0" err="1"/>
+              <a:t>sys.path.append</a:t>
+            </a:r>
+            <a:r>
+              <a:rPr lang="en-US" dirty="0"/>
+              <a:t>()</a:t>
+            </a:r>
+          </a:p>
+          <a:p>
+            <a:endParaRPr lang="en-AU" dirty="0"/>
+          </a:p>
+        </p:txBody>
+      </p:sp>
+    </p:spTree>
+    <p:extLst>
+      <p:ext uri="{BB962C8B-B14F-4D97-AF65-F5344CB8AC3E}">
+        <p14:creationId xmlns:p14="http://schemas.microsoft.com/office/powerpoint/2010/main" val="1257776886"/>
+      </p:ext>
+    </p:extLst>
+  </p:cSld>
+  <p:clrMapOvr>
+    <a:masterClrMapping/>
+  </p:clrMapOvr>
+</p:sld>
+</file>
+
+<file path=ppt/slides/slide17.xml><?xml version="1.0" encoding="utf-8"?>
+<p:sld xmlns:a="http://schemas.openxmlformats.org/drawingml/2006/main" xmlns:r="http://schemas.openxmlformats.org/officeDocument/2006/relationships" xmlns:p="http://schemas.openxmlformats.org/presentationml/2006/main">
+  <p:cSld>
+    <p:spTree>
+      <p:nvGrpSpPr>
+        <p:cNvPr id="1" name=""/>
+        <p:cNvGrpSpPr/>
+        <p:nvPr/>
+      </p:nvGrpSpPr>
+      <p:grpSpPr>
+        <a:xfrm>
+          <a:off x="0" y="0"/>
+          <a:ext cx="0" cy="0"/>
+          <a:chOff x="0" y="0"/>
+          <a:chExt cx="0" cy="0"/>
+        </a:xfrm>
+      </p:grpSpPr>
+      <p:sp>
+        <p:nvSpPr>
+          <p:cNvPr id="5" name="Content Placeholder 4">
+            <a:extLst>
+              <a:ext uri="{FF2B5EF4-FFF2-40B4-BE49-F238E27FC236}">
+                <a16:creationId xmlns:a16="http://schemas.microsoft.com/office/drawing/2014/main" id="{4B49ED77-0BE2-4780-83AE-757E60C73DEB}"/>
+              </a:ext>
+            </a:extLst>
+          </p:cNvPr>
+          <p:cNvSpPr>
+            <a:spLocks noGrp="1"/>
+          </p:cNvSpPr>
+          <p:nvPr>
+            <p:ph sz="half" idx="1"/>
+          </p:nvPr>
+        </p:nvSpPr>
+        <p:spPr/>
+        <p:txBody>
+          <a:bodyPr/>
+          <a:lstStyle/>
+          <a:p>
+            <a:r>
+              <a:rPr lang="en-US" dirty="0"/>
+              <a:t>Tips!</a:t>
+            </a:r>
+            <a:endParaRPr lang="en-AU" dirty="0"/>
+          </a:p>
+        </p:txBody>
+      </p:sp>
+      <p:sp>
+        <p:nvSpPr>
+          <p:cNvPr id="6" name="Content Placeholder 5">
+            <a:extLst>
+              <a:ext uri="{FF2B5EF4-FFF2-40B4-BE49-F238E27FC236}">
+                <a16:creationId xmlns:a16="http://schemas.microsoft.com/office/drawing/2014/main" id="{F95B41C1-24D5-4CAD-9930-5330D64715B2}"/>
+              </a:ext>
+            </a:extLst>
+          </p:cNvPr>
+          <p:cNvSpPr>
+            <a:spLocks noGrp="1"/>
+          </p:cNvSpPr>
+          <p:nvPr>
+            <p:ph sz="half" idx="2"/>
+          </p:nvPr>
+        </p:nvSpPr>
+        <p:spPr/>
+        <p:txBody>
+          <a:bodyPr/>
+          <a:lstStyle/>
+          <a:p>
+            <a:endParaRPr lang="en-AU" dirty="0"/>
+          </a:p>
+        </p:txBody>
+      </p:sp>
+    </p:spTree>
+    <p:extLst>
+      <p:ext uri="{BB962C8B-B14F-4D97-AF65-F5344CB8AC3E}">
+        <p14:creationId xmlns:p14="http://schemas.microsoft.com/office/powerpoint/2010/main" val="3239995260"/>
+      </p:ext>
+    </p:extLst>
+  </p:cSld>
+  <p:clrMapOvr>
+    <a:masterClrMapping/>
+  </p:clrMapOvr>
+</p:sld>
+</file>
+
+<file path=ppt/slides/slide18.xml><?xml version="1.0" encoding="utf-8"?>
+<p:sld xmlns:a="http://schemas.openxmlformats.org/drawingml/2006/main" xmlns:r="http://schemas.openxmlformats.org/officeDocument/2006/relationships" xmlns:p="http://schemas.openxmlformats.org/presentationml/2006/main">
+  <p:cSld>
+    <p:spTree>
+      <p:nvGrpSpPr>
+        <p:cNvPr id="1" name=""/>
+        <p:cNvGrpSpPr/>
+        <p:nvPr/>
+      </p:nvGrpSpPr>
+      <p:grpSpPr>
+        <a:xfrm>
+          <a:off x="0" y="0"/>
+          <a:ext cx="0" cy="0"/>
+          <a:chOff x="0" y="0"/>
+          <a:chExt cx="0" cy="0"/>
+        </a:xfrm>
+      </p:grpSpPr>
+      <p:sp>
+        <p:nvSpPr>
+          <p:cNvPr id="5" name="Title 4">
+            <a:extLst>
+              <a:ext uri="{FF2B5EF4-FFF2-40B4-BE49-F238E27FC236}">
+                <a16:creationId xmlns:a16="http://schemas.microsoft.com/office/drawing/2014/main" id="{0D7C7FF6-CBF0-4474-BA16-66F86EEB02E2}"/>
+              </a:ext>
+            </a:extLst>
+          </p:cNvPr>
+          <p:cNvSpPr>
+            <a:spLocks noGrp="1"/>
+          </p:cNvSpPr>
+          <p:nvPr>
+            <p:ph type="title"/>
+          </p:nvPr>
+        </p:nvSpPr>
+        <p:spPr/>
+        <p:txBody>
+          <a:bodyPr/>
+          <a:lstStyle/>
+          <a:p>
+            <a:r>
+              <a:rPr lang="en-US" dirty="0"/>
+              <a:t>Happy </a:t>
+            </a:r>
+            <a:r>
+              <a:rPr lang="en-US" dirty="0" err="1"/>
+              <a:t>Notebooking</a:t>
+            </a:r>
+            <a:r>
+              <a:rPr lang="en-US" dirty="0"/>
+              <a:t>!</a:t>
+            </a:r>
+            <a:endParaRPr lang="en-AU" dirty="0"/>
+          </a:p>
+        </p:txBody>
+      </p:sp>
+      <p:sp>
+        <p:nvSpPr>
+          <p:cNvPr id="6" name="Content Placeholder 5">
+            <a:extLst>
+              <a:ext uri="{FF2B5EF4-FFF2-40B4-BE49-F238E27FC236}">
+                <a16:creationId xmlns:a16="http://schemas.microsoft.com/office/drawing/2014/main" id="{12868278-2F98-4A0B-9FA9-5DAED4043FFC}"/>
+              </a:ext>
+            </a:extLst>
+          </p:cNvPr>
+          <p:cNvSpPr>
+            <a:spLocks noGrp="1"/>
+          </p:cNvSpPr>
+          <p:nvPr>
+            <p:ph idx="1"/>
+          </p:nvPr>
+        </p:nvSpPr>
+        <p:spPr/>
+        <p:txBody>
+          <a:bodyPr/>
+          <a:lstStyle/>
+          <a:p>
+            <a:r>
+              <a:rPr lang="en-US" dirty="0"/>
+              <a:t>Restart &amp; Run All!</a:t>
+            </a:r>
+          </a:p>
+          <a:p>
+            <a:r>
+              <a:rPr lang="en-US" dirty="0"/>
+              <a:t>Be kind to yourself – we’re all always learning</a:t>
+            </a:r>
+          </a:p>
+          <a:p>
+            <a:r>
+              <a:rPr lang="en-US" dirty="0"/>
+              <a:t>Try one thing at a time - as long as the rest of it works, you can learn the next bit later one</a:t>
+            </a:r>
+          </a:p>
+          <a:p>
+            <a:r>
+              <a:rPr lang="en-US" dirty="0"/>
+              <a:t>Assume everything will be reused</a:t>
+            </a:r>
+          </a:p>
+          <a:p>
+            <a:r>
+              <a:rPr lang="en-US" dirty="0"/>
+              <a:t>Focus on consistency &amp; quality</a:t>
+            </a:r>
+          </a:p>
+          <a:p>
+            <a:r>
+              <a:rPr lang="en-US" dirty="0"/>
+              <a:t>Let things go</a:t>
+            </a:r>
+          </a:p>
+        </p:txBody>
+      </p:sp>
+    </p:spTree>
+    <p:extLst>
+      <p:ext uri="{BB962C8B-B14F-4D97-AF65-F5344CB8AC3E}">
+        <p14:creationId xmlns:p14="http://schemas.microsoft.com/office/powerpoint/2010/main" val="1662339128"/>
       </p:ext>
     </p:extLst>
   </p:cSld>
@@ -4037,6 +5044,15 @@
             </a:pPr>
             <a:r>
               <a:rPr lang="en-US" dirty="0"/>
+              <a:t>Physics/Astro something?</a:t>
+            </a:r>
+          </a:p>
+          <a:p>
+            <a:pPr marL="0" indent="0">
+              <a:buNone/>
+            </a:pPr>
+            <a:r>
+              <a:rPr lang="en-US" dirty="0"/>
               <a:t>Rock climbing / kayaking photo</a:t>
             </a:r>
           </a:p>
@@ -4063,12 +5079,8 @@
               <a:buNone/>
             </a:pPr>
             <a:r>
-              <a:rPr lang="en-US" dirty="0" err="1"/>
-              <a:t>Neighbourlytics</a:t>
-            </a:r>
-            <a:r>
-              <a:rPr lang="en-US" dirty="0"/>
-              <a:t> logo</a:t>
+              <a:rPr lang="en-US" dirty="0"/>
+              <a:t>Neighbourlytics logo</a:t>
             </a:r>
           </a:p>
         </p:txBody>
@@ -4412,31 +5424,6 @@
           </a:p>
         </p:txBody>
       </p:sp>
-      <p:sp>
-        <p:nvSpPr>
-          <p:cNvPr id="3" name="Content Placeholder 2">
-            <a:extLst>
-              <a:ext uri="{FF2B5EF4-FFF2-40B4-BE49-F238E27FC236}">
-                <a16:creationId xmlns:a16="http://schemas.microsoft.com/office/drawing/2014/main" id="{53CAC3CD-AE87-4C90-88E4-BBAE897CDC20}"/>
-              </a:ext>
-            </a:extLst>
-          </p:cNvPr>
-          <p:cNvSpPr>
-            <a:spLocks noGrp="1"/>
-          </p:cNvSpPr>
-          <p:nvPr>
-            <p:ph idx="1"/>
-          </p:nvPr>
-        </p:nvSpPr>
-        <p:spPr/>
-        <p:txBody>
-          <a:bodyPr/>
-          <a:lstStyle/>
-          <a:p>
-            <a:endParaRPr lang="en-AU"/>
-          </a:p>
-        </p:txBody>
-      </p:sp>
     </p:spTree>
     <p:extLst>
       <p:ext uri="{BB962C8B-B14F-4D97-AF65-F5344CB8AC3E}">
@@ -4517,7 +5504,22 @@
           <a:bodyPr/>
           <a:lstStyle/>
           <a:p>
-            <a:endParaRPr lang="en-AU" dirty="0"/>
+            <a:r>
+              <a:rPr lang="en-US" dirty="0"/>
+              <a:t>Keep things together – bunch your code in a cell, even if you’re not writing functions</a:t>
+            </a:r>
+          </a:p>
+          <a:p>
+            <a:r>
+              <a:rPr lang="en-US" dirty="0"/>
+              <a:t>Restart &amp; Run All</a:t>
+            </a:r>
+          </a:p>
+          <a:p>
+            <a:r>
+              <a:rPr lang="en-US" dirty="0"/>
+              <a:t>Review your logic</a:t>
+            </a:r>
           </a:p>
         </p:txBody>
       </p:sp>
@@ -4574,7 +5576,7 @@
           <a:p>
             <a:r>
               <a:rPr lang="en-US" dirty="0"/>
-              <a:t>Uh Oh #2: But I’m not confident with terminal</a:t>
+              <a:t>Uh Oh #2: Wait, someone else wants to look at this visualization?</a:t>
             </a:r>
             <a:endParaRPr lang="en-AU" dirty="0"/>
           </a:p>
@@ -4601,14 +5603,30 @@
           <a:bodyPr/>
           <a:lstStyle/>
           <a:p>
-            <a:endParaRPr lang="en-AU"/>
+            <a:r>
+              <a:rPr lang="en-US" dirty="0"/>
+              <a:t>I’ll just send them a screenshot</a:t>
+            </a:r>
+          </a:p>
+          <a:p>
+            <a:r>
+              <a:rPr lang="en-US" dirty="0"/>
+              <a:t>I’ll do my vis here &amp; export theirs after</a:t>
+            </a:r>
+          </a:p>
+          <a:p>
+            <a:r>
+              <a:rPr lang="en-US" dirty="0"/>
+              <a:t>I guess I could just look at what I’m giving them…</a:t>
+            </a:r>
+            <a:endParaRPr lang="en-AU" dirty="0"/>
           </a:p>
         </p:txBody>
       </p:sp>
     </p:spTree>
     <p:extLst>
       <p:ext uri="{BB962C8B-B14F-4D97-AF65-F5344CB8AC3E}">
-        <p14:creationId xmlns:p14="http://schemas.microsoft.com/office/powerpoint/2010/main" val="4289203544"/>
+        <p14:creationId xmlns:p14="http://schemas.microsoft.com/office/powerpoint/2010/main" val="2859488379"/>
       </p:ext>
     </p:extLst>
   </p:cSld>
@@ -4692,7 +5710,7 @@
     </p:spTree>
     <p:extLst>
       <p:ext uri="{BB962C8B-B14F-4D97-AF65-F5344CB8AC3E}">
-        <p14:creationId xmlns:p14="http://schemas.microsoft.com/office/powerpoint/2010/main" val="1318217686"/>
+        <p14:creationId xmlns:p14="http://schemas.microsoft.com/office/powerpoint/2010/main" val="1655521303"/>
       </p:ext>
     </p:extLst>
   </p:cSld>
@@ -4995,4 +6013,299 @@
     </a:ext>
   </a:extLst>
 </a:theme>
+</file>
+
+<file path=ppt/theme/theme2.xml><?xml version="1.0" encoding="utf-8"?>
+<a:theme xmlns:a="http://schemas.openxmlformats.org/drawingml/2006/main" name="Office Theme">
+  <a:themeElements>
+    <a:clrScheme name="Office">
+      <a:dk1>
+        <a:sysClr val="windowText" lastClr="000000"/>
+      </a:dk1>
+      <a:lt1>
+        <a:sysClr val="window" lastClr="FFFFFF"/>
+      </a:lt1>
+      <a:dk2>
+        <a:srgbClr val="44546A"/>
+      </a:dk2>
+      <a:lt2>
+        <a:srgbClr val="E7E6E6"/>
+      </a:lt2>
+      <a:accent1>
+        <a:srgbClr val="4472C4"/>
+      </a:accent1>
+      <a:accent2>
+        <a:srgbClr val="ED7D31"/>
+      </a:accent2>
+      <a:accent3>
+        <a:srgbClr val="A5A5A5"/>
+      </a:accent3>
+      <a:accent4>
+        <a:srgbClr val="FFC000"/>
+      </a:accent4>
+      <a:accent5>
+        <a:srgbClr val="5B9BD5"/>
+      </a:accent5>
+      <a:accent6>
+        <a:srgbClr val="70AD47"/>
+      </a:accent6>
+      <a:hlink>
+        <a:srgbClr val="0563C1"/>
+      </a:hlink>
+      <a:folHlink>
+        <a:srgbClr val="954F72"/>
+      </a:folHlink>
+    </a:clrScheme>
+    <a:fontScheme name="Office">
+      <a:majorFont>
+        <a:latin typeface="Calibri Light" panose="020F0302020204030204"/>
+        <a:ea typeface=""/>
+        <a:cs typeface=""/>
+        <a:font script="Jpan" typeface="游ゴシック Light"/>
+        <a:font script="Hang" typeface="맑은 고딕"/>
+        <a:font script="Hans" typeface="等线 Light"/>
+        <a:font script="Hant" typeface="新細明體"/>
+        <a:font script="Arab" typeface="Times New Roman"/>
+        <a:font script="Hebr" typeface="Times New Roman"/>
+        <a:font script="Thai" typeface="Angsana New"/>
+        <a:font script="Ethi" typeface="Nyala"/>
+        <a:font script="Beng" typeface="Vrinda"/>
+        <a:font script="Gujr" typeface="Shruti"/>
+        <a:font script="Khmr" typeface="MoolBoran"/>
+        <a:font script="Knda" typeface="Tunga"/>
+        <a:font script="Guru" typeface="Raavi"/>
+        <a:font script="Cans" typeface="Euphemia"/>
+        <a:font script="Cher" typeface="Plantagenet Cherokee"/>
+        <a:font script="Yiii" typeface="Microsoft Yi Baiti"/>
+        <a:font script="Tibt" typeface="Microsoft Himalaya"/>
+        <a:font script="Thaa" typeface="MV Boli"/>
+        <a:font script="Deva" typeface="Mangal"/>
+        <a:font script="Telu" typeface="Gautami"/>
+        <a:font script="Taml" typeface="Latha"/>
+        <a:font script="Syrc" typeface="Estrangelo Edessa"/>
+        <a:font script="Orya" typeface="Kalinga"/>
+        <a:font script="Mlym" typeface="Kartika"/>
+        <a:font script="Laoo" typeface="DokChampa"/>
+        <a:font script="Sinh" typeface="Iskoola Pota"/>
+        <a:font script="Mong" typeface="Mongolian Baiti"/>
+        <a:font script="Viet" typeface="Times New Roman"/>
+        <a:font script="Uigh" typeface="Microsoft Uighur"/>
+        <a:font script="Geor" typeface="Sylfaen"/>
+        <a:font script="Armn" typeface="Arial"/>
+        <a:font script="Bugi" typeface="Leelawadee UI"/>
+        <a:font script="Bopo" typeface="Microsoft JhengHei"/>
+        <a:font script="Java" typeface="Javanese Text"/>
+        <a:font script="Lisu" typeface="Segoe UI"/>
+        <a:font script="Mymr" typeface="Myanmar Text"/>
+        <a:font script="Nkoo" typeface="Ebrima"/>
+        <a:font script="Olck" typeface="Nirmala UI"/>
+        <a:font script="Osma" typeface="Ebrima"/>
+        <a:font script="Phag" typeface="Phagspa"/>
+        <a:font script="Syrn" typeface="Estrangelo Edessa"/>
+        <a:font script="Syrj" typeface="Estrangelo Edessa"/>
+        <a:font script="Syre" typeface="Estrangelo Edessa"/>
+        <a:font script="Sora" typeface="Nirmala UI"/>
+        <a:font script="Tale" typeface="Microsoft Tai Le"/>
+        <a:font script="Talu" typeface="Microsoft New Tai Lue"/>
+        <a:font script="Tfng" typeface="Ebrima"/>
+      </a:majorFont>
+      <a:minorFont>
+        <a:latin typeface="Calibri" panose="020F0502020204030204"/>
+        <a:ea typeface=""/>
+        <a:cs typeface=""/>
+        <a:font script="Jpan" typeface="游ゴシック"/>
+        <a:font script="Hang" typeface="맑은 고딕"/>
+        <a:font script="Hans" typeface="等线"/>
+        <a:font script="Hant" typeface="新細明體"/>
+        <a:font script="Arab" typeface="Arial"/>
+        <a:font script="Hebr" typeface="Arial"/>
+        <a:font script="Thai" typeface="Cordia New"/>
+        <a:font script="Ethi" typeface="Nyala"/>
+        <a:font script="Beng" typeface="Vrinda"/>
+        <a:font script="Gujr" typeface="Shruti"/>
+        <a:font script="Khmr" typeface="DaunPenh"/>
+        <a:font script="Knda" typeface="Tunga"/>
+        <a:font script="Guru" typeface="Raavi"/>
+        <a:font script="Cans" typeface="Euphemia"/>
+        <a:font script="Cher" typeface="Plantagenet Cherokee"/>
+        <a:font script="Yiii" typeface="Microsoft Yi Baiti"/>
+        <a:font script="Tibt" typeface="Microsoft Himalaya"/>
+        <a:font script="Thaa" typeface="MV Boli"/>
+        <a:font script="Deva" typeface="Mangal"/>
+        <a:font script="Telu" typeface="Gautami"/>
+        <a:font script="Taml" typeface="Latha"/>
+        <a:font script="Syrc" typeface="Estrangelo Edessa"/>
+        <a:font script="Orya" typeface="Kalinga"/>
+        <a:font script="Mlym" typeface="Kartika"/>
+        <a:font script="Laoo" typeface="DokChampa"/>
+        <a:font script="Sinh" typeface="Iskoola Pota"/>
+        <a:font script="Mong" typeface="Mongolian Baiti"/>
+        <a:font script="Viet" typeface="Arial"/>
+        <a:font script="Uigh" typeface="Microsoft Uighur"/>
+        <a:font script="Geor" typeface="Sylfaen"/>
+        <a:font script="Armn" typeface="Arial"/>
+        <a:font script="Bugi" typeface="Leelawadee UI"/>
+        <a:font script="Bopo" typeface="Microsoft JhengHei"/>
+        <a:font script="Java" typeface="Javanese Text"/>
+        <a:font script="Lisu" typeface="Segoe UI"/>
+        <a:font script="Mymr" typeface="Myanmar Text"/>
+        <a:font script="Nkoo" typeface="Ebrima"/>
+        <a:font script="Olck" typeface="Nirmala UI"/>
+        <a:font script="Osma" typeface="Ebrima"/>
+        <a:font script="Phag" typeface="Phagspa"/>
+        <a:font script="Syrn" typeface="Estrangelo Edessa"/>
+        <a:font script="Syrj" typeface="Estrangelo Edessa"/>
+        <a:font script="Syre" typeface="Estrangelo Edessa"/>
+        <a:font script="Sora" typeface="Nirmala UI"/>
+        <a:font script="Tale" typeface="Microsoft Tai Le"/>
+        <a:font script="Talu" typeface="Microsoft New Tai Lue"/>
+        <a:font script="Tfng" typeface="Ebrima"/>
+      </a:minorFont>
+    </a:fontScheme>
+    <a:fmtScheme name="Office">
+      <a:fillStyleLst>
+        <a:solidFill>
+          <a:schemeClr val="phClr"/>
+        </a:solidFill>
+        <a:gradFill rotWithShape="1">
+          <a:gsLst>
+            <a:gs pos="0">
+              <a:schemeClr val="phClr">
+                <a:lumMod val="110000"/>
+                <a:satMod val="105000"/>
+                <a:tint val="67000"/>
+              </a:schemeClr>
+            </a:gs>
+            <a:gs pos="50000">
+              <a:schemeClr val="phClr">
+                <a:lumMod val="105000"/>
+                <a:satMod val="103000"/>
+                <a:tint val="73000"/>
+              </a:schemeClr>
+            </a:gs>
+            <a:gs pos="100000">
+              <a:schemeClr val="phClr">
+                <a:lumMod val="105000"/>
+                <a:satMod val="109000"/>
+                <a:tint val="81000"/>
+              </a:schemeClr>
+            </a:gs>
+          </a:gsLst>
+          <a:lin ang="5400000" scaled="0"/>
+        </a:gradFill>
+        <a:gradFill rotWithShape="1">
+          <a:gsLst>
+            <a:gs pos="0">
+              <a:schemeClr val="phClr">
+                <a:satMod val="103000"/>
+                <a:lumMod val="102000"/>
+                <a:tint val="94000"/>
+              </a:schemeClr>
+            </a:gs>
+            <a:gs pos="50000">
+              <a:schemeClr val="phClr">
+                <a:satMod val="110000"/>
+                <a:lumMod val="100000"/>
+                <a:shade val="100000"/>
+              </a:schemeClr>
+            </a:gs>
+            <a:gs pos="100000">
+              <a:schemeClr val="phClr">
+                <a:lumMod val="99000"/>
+                <a:satMod val="120000"/>
+                <a:shade val="78000"/>
+              </a:schemeClr>
+            </a:gs>
+          </a:gsLst>
+          <a:lin ang="5400000" scaled="0"/>
+        </a:gradFill>
+      </a:fillStyleLst>
+      <a:lnStyleLst>
+        <a:ln w="6350" cap="flat" cmpd="sng" algn="ctr">
+          <a:solidFill>
+            <a:schemeClr val="phClr"/>
+          </a:solidFill>
+          <a:prstDash val="solid"/>
+          <a:miter lim="800000"/>
+        </a:ln>
+        <a:ln w="12700" cap="flat" cmpd="sng" algn="ctr">
+          <a:solidFill>
+            <a:schemeClr val="phClr"/>
+          </a:solidFill>
+          <a:prstDash val="solid"/>
+          <a:miter lim="800000"/>
+        </a:ln>
+        <a:ln w="19050" cap="flat" cmpd="sng" algn="ctr">
+          <a:solidFill>
+            <a:schemeClr val="phClr"/>
+          </a:solidFill>
+          <a:prstDash val="solid"/>
+          <a:miter lim="800000"/>
+        </a:ln>
+      </a:lnStyleLst>
+      <a:effectStyleLst>
+        <a:effectStyle>
+          <a:effectLst/>
+        </a:effectStyle>
+        <a:effectStyle>
+          <a:effectLst/>
+        </a:effectStyle>
+        <a:effectStyle>
+          <a:effectLst>
+            <a:outerShdw blurRad="57150" dist="19050" dir="5400000" algn="ctr" rotWithShape="0">
+              <a:srgbClr val="000000">
+                <a:alpha val="63000"/>
+              </a:srgbClr>
+            </a:outerShdw>
+          </a:effectLst>
+        </a:effectStyle>
+      </a:effectStyleLst>
+      <a:bgFillStyleLst>
+        <a:solidFill>
+          <a:schemeClr val="phClr"/>
+        </a:solidFill>
+        <a:solidFill>
+          <a:schemeClr val="phClr">
+            <a:tint val="95000"/>
+            <a:satMod val="170000"/>
+          </a:schemeClr>
+        </a:solidFill>
+        <a:gradFill rotWithShape="1">
+          <a:gsLst>
+            <a:gs pos="0">
+              <a:schemeClr val="phClr">
+                <a:tint val="93000"/>
+                <a:satMod val="150000"/>
+                <a:shade val="98000"/>
+                <a:lumMod val="102000"/>
+              </a:schemeClr>
+            </a:gs>
+            <a:gs pos="50000">
+              <a:schemeClr val="phClr">
+                <a:tint val="98000"/>
+                <a:satMod val="130000"/>
+                <a:shade val="90000"/>
+                <a:lumMod val="103000"/>
+              </a:schemeClr>
+            </a:gs>
+            <a:gs pos="100000">
+              <a:schemeClr val="phClr">
+                <a:shade val="63000"/>
+                <a:satMod val="120000"/>
+              </a:schemeClr>
+            </a:gs>
+          </a:gsLst>
+          <a:lin ang="5400000" scaled="0"/>
+        </a:gradFill>
+      </a:bgFillStyleLst>
+    </a:fmtScheme>
+  </a:themeElements>
+  <a:objectDefaults/>
+  <a:extraClrSchemeLst/>
+  <a:extLst>
+    <a:ext uri="{05A4C25C-085E-4340-85A3-A5531E510DB2}">
+      <thm15:themeFamily xmlns:thm15="http://schemas.microsoft.com/office/thememl/2012/main" name="Office Theme" id="{62F939B6-93AF-4DB8-9C6B-D6C7DFDC589F}" vid="{4A3C46E8-61CC-4603-A589-7422A47A8E4A}"/>
+    </a:ext>
+  </a:extLst>
+</a:theme>
 </file>
</xml_diff>